<commit_message>
Make minor modifications on the slides - fix typo
</commit_message>
<xml_diff>
--- a/slides/First print.pptx
+++ b/slides/First print.pptx
@@ -1257,7 +1257,7 @@
         </p:nvSpPr>
         <p:spPr>
           <a:xfrm>
-            <a:off x="381300" y="685800"/>
+            <a:off x="381000" y="685800"/>
             <a:ext cx="6096000" cy="3429000"/>
           </a:xfrm>
           <a:custGeom>
@@ -1320,7 +1320,7 @@
               </a:spcAft>
               <a:buNone/>
             </a:pPr>
-            <a:endParaRPr/>
+            <a:endParaRPr dirty="0"/>
           </a:p>
         </p:txBody>
       </p:sp>
@@ -1361,7 +1361,7 @@
         </p:nvSpPr>
         <p:spPr>
           <a:xfrm>
-            <a:off x="381300" y="685800"/>
+            <a:off x="381000" y="685800"/>
             <a:ext cx="6096000" cy="3429000"/>
           </a:xfrm>
           <a:custGeom>
@@ -7768,34 +7768,7 @@
                 </a:solidFill>
                 <a:hlinkClick r:id="rId3"/>
               </a:rPr>
-              <a:t>Yummy</a:t>
-            </a:r>
-            <a:r>
-              <a:rPr lang="en" sz="1820" b="1" u="sng">
-                <a:solidFill>
-                  <a:schemeClr val="hlink"/>
-                </a:solidFill>
-                <a:hlinkClick r:id="rId3"/>
-              </a:rPr>
-              <a:t> </a:t>
-            </a:r>
-            <a:r>
-              <a:rPr lang="en" sz="1820" b="1" u="sng">
-                <a:solidFill>
-                  <a:schemeClr val="hlink"/>
-                </a:solidFill>
-                <a:hlinkClick r:id="rId3"/>
-              </a:rPr>
-              <a:t>(local) </a:t>
-            </a:r>
-            <a:r>
-              <a:rPr lang="en" sz="1820" b="1" u="sng">
-                <a:solidFill>
-                  <a:schemeClr val="hlink"/>
-                </a:solidFill>
-                <a:hlinkClick r:id="rId3"/>
-              </a:rPr>
-              <a:t>Demo</a:t>
+              <a:t>Yummy (local) Demo</a:t>
             </a:r>
             <a:r>
               <a:rPr lang="en" sz="1820" b="1"/>
@@ -7962,14 +7935,14 @@
               <a:buAutoNum type="arabicPeriod"/>
             </a:pPr>
             <a:r>
-              <a:rPr lang="en" sz="1400" b="1">
+              <a:rPr lang="en" sz="1400" b="1" dirty="0">
                 <a:solidFill>
                   <a:schemeClr val="dk1"/>
                 </a:solidFill>
               </a:rPr>
               <a:t>How to store the quantity of a dish in an order</a:t>
             </a:r>
-            <a:endParaRPr sz="1400">
+            <a:endParaRPr sz="1400" dirty="0">
               <a:solidFill>
                 <a:schemeClr val="dk1"/>
               </a:solidFill>
@@ -7986,14 +7959,14 @@
               <a:buNone/>
             </a:pPr>
             <a:r>
-              <a:rPr lang="en" sz="1400">
+              <a:rPr lang="en" sz="1400" dirty="0">
                 <a:solidFill>
                   <a:schemeClr val="dk1"/>
                 </a:solidFill>
               </a:rPr>
               <a:t>We need to store both the name and quantity of a dish in an order. </a:t>
             </a:r>
-            <a:endParaRPr sz="1400">
+            <a:endParaRPr sz="1400" dirty="0">
               <a:solidFill>
                 <a:schemeClr val="dk1"/>
               </a:solidFill>
@@ -8010,7 +7983,7 @@
               <a:buNone/>
             </a:pPr>
             <a:r>
-              <a:rPr lang="en" sz="1400">
+              <a:rPr lang="en" sz="1400" dirty="0">
                 <a:solidFill>
                   <a:schemeClr val="dk1"/>
                 </a:solidFill>
@@ -8021,7 +7994,7 @@
               <a:t>Solution</a:t>
             </a:r>
             <a:r>
-              <a:rPr lang="en" sz="1400">
+              <a:rPr lang="en" sz="1400" dirty="0">
                 <a:solidFill>
                   <a:schemeClr val="dk1"/>
                 </a:solidFill>
@@ -8032,7 +8005,7 @@
               <a:t>: </a:t>
             </a:r>
             <a:r>
-              <a:rPr lang="en" sz="1400">
+              <a:rPr lang="en" sz="1400" dirty="0">
                 <a:solidFill>
                   <a:schemeClr val="dk1"/>
                 </a:solidFill>
@@ -8040,7 +8013,7 @@
               <a:t>Created an Order model and FoodSet model. FoodSet instances store the dish and corresponding quantity for a specific order. Order instances have </a:t>
             </a:r>
             <a:r>
-              <a:rPr lang="en" sz="1400" i="1">
+              <a:rPr lang="en" sz="1400" i="1" dirty="0">
                 <a:solidFill>
                   <a:schemeClr val="dk1"/>
                 </a:solidFill>
@@ -8048,21 +8021,21 @@
               <a:t>ManyToMany</a:t>
             </a:r>
             <a:r>
-              <a:rPr lang="en" sz="1400">
+              <a:rPr lang="en" sz="1400" dirty="0">
                 <a:solidFill>
                   <a:schemeClr val="dk1"/>
                 </a:solidFill>
               </a:rPr>
               <a:t> relationship with FoodSet instances.</a:t>
             </a:r>
-            <a:endParaRPr sz="1400">
+            <a:endParaRPr sz="1400" dirty="0">
               <a:solidFill>
                 <a:schemeClr val="dk1"/>
               </a:solidFill>
             </a:endParaRPr>
           </a:p>
           <a:p>
-            <a:pPr marL="457200" lvl="0" indent="-317500" algn="l" rtl="0">
+            <a:pPr marL="139700" lvl="0" indent="0" algn="l" rtl="0">
               <a:spcBef>
                 <a:spcPts val="1200"/>
               </a:spcBef>
@@ -8073,17 +8046,17 @@
                 <a:schemeClr val="dk1"/>
               </a:buClr>
               <a:buSzPts val="1400"/>
-              <a:buAutoNum type="arabicPeriod"/>
+              <a:buNone/>
             </a:pPr>
             <a:r>
-              <a:rPr lang="en" sz="1400" b="1">
+              <a:rPr lang="en" sz="1400" b="1" dirty="0">
                 <a:solidFill>
                   <a:schemeClr val="dk1"/>
                 </a:solidFill>
               </a:rPr>
-              <a:t>CSS conflicts and inconsistency</a:t>
+              <a:t>2.   CSS conflicts and inconsistency</a:t>
             </a:r>
-            <a:endParaRPr sz="1400" b="1">
+            <a:endParaRPr sz="1400" b="1" dirty="0">
               <a:solidFill>
                 <a:schemeClr val="dk1"/>
               </a:solidFill>
@@ -8100,14 +8073,14 @@
               <a:buNone/>
             </a:pPr>
             <a:r>
-              <a:rPr lang="en" sz="1400">
+              <a:rPr lang="en" sz="1400" dirty="0">
                 <a:solidFill>
                   <a:schemeClr val="dk1"/>
                 </a:solidFill>
               </a:rPr>
               <a:t>Now we are using ONE css file for all html pages, which results in conflicts and inconsistency.</a:t>
             </a:r>
-            <a:endParaRPr sz="1400">
+            <a:endParaRPr sz="1400" dirty="0">
               <a:solidFill>
                 <a:schemeClr val="dk1"/>
               </a:solidFill>
@@ -8124,7 +8097,7 @@
               <a:buNone/>
             </a:pPr>
             <a:r>
-              <a:rPr lang="en" sz="1400">
+              <a:rPr lang="en" sz="1400" dirty="0">
                 <a:solidFill>
                   <a:schemeClr val="dk1"/>
                 </a:solidFill>
@@ -8135,14 +8108,22 @@
               <a:t>Solution</a:t>
             </a:r>
             <a:r>
-              <a:rPr lang="en" sz="1400">
+              <a:rPr lang="en" sz="1400" dirty="0">
                 <a:solidFill>
                   <a:schemeClr val="dk1"/>
                 </a:solidFill>
               </a:rPr>
               <a:t>: decouple the css file to achieve single responsibility design pattern and avoid conflicts</a:t>
             </a:r>
-            <a:endParaRPr sz="1400">
+            <a:r>
+              <a:rPr lang="en-US" sz="1400" dirty="0">
+                <a:solidFill>
+                  <a:schemeClr val="dk1"/>
+                </a:solidFill>
+              </a:rPr>
+              <a:t>.</a:t>
+            </a:r>
+            <a:endParaRPr sz="1400" dirty="0">
               <a:solidFill>
                 <a:schemeClr val="dk1"/>
               </a:solidFill>
@@ -8158,7 +8139,7 @@
               </a:spcAft>
               <a:buNone/>
             </a:pPr>
-            <a:endParaRPr sz="1400">
+            <a:endParaRPr sz="1400" dirty="0">
               <a:solidFill>
                 <a:schemeClr val="dk1"/>
               </a:solidFill>
@@ -8174,7 +8155,7 @@
               </a:spcAft>
               <a:buNone/>
             </a:pPr>
-            <a:endParaRPr sz="1400">
+            <a:endParaRPr sz="1400" dirty="0">
               <a:solidFill>
                 <a:schemeClr val="dk1"/>
               </a:solidFill>
@@ -8341,14 +8322,14 @@
               <a:buAutoNum type="arabicPeriod"/>
             </a:pPr>
             <a:r>
-              <a:rPr lang="en" sz="1600">
+              <a:rPr lang="en" sz="1600" dirty="0">
                 <a:solidFill>
                   <a:schemeClr val="dk1"/>
                 </a:solidFill>
               </a:rPr>
-              <a:t>Fill the database with dish information</a:t>
+              <a:t>Store dish information in database</a:t>
             </a:r>
-            <a:endParaRPr sz="1600">
+            <a:endParaRPr sz="1600" dirty="0">
               <a:solidFill>
                 <a:schemeClr val="dk1"/>
               </a:solidFill>
@@ -8372,14 +8353,14 @@
               <a:buAutoNum type="arabicPeriod"/>
             </a:pPr>
             <a:r>
-              <a:rPr lang="en" sz="1600">
+              <a:rPr lang="en" sz="1600" dirty="0">
                 <a:solidFill>
                   <a:schemeClr val="dk1"/>
                 </a:solidFill>
               </a:rPr>
               <a:t>Implement the reservation function (bump up a message on the page instantly after successfully reserve, and save this record in the database)</a:t>
             </a:r>
-            <a:endParaRPr sz="1600">
+            <a:endParaRPr sz="1600" dirty="0">
               <a:solidFill>
                 <a:schemeClr val="dk1"/>
               </a:solidFill>
@@ -8403,14 +8384,14 @@
               <a:buAutoNum type="arabicPeriod"/>
             </a:pPr>
             <a:r>
-              <a:rPr lang="en" sz="1600">
+              <a:rPr lang="en" sz="1600" dirty="0">
                 <a:solidFill>
                   <a:schemeClr val="dk1"/>
                 </a:solidFill>
               </a:rPr>
-              <a:t>Make the plus sign (+) and the favorite button work</a:t>
+              <a:t>Make the plus sign (add to cart function) and the favorite button work</a:t>
             </a:r>
-            <a:endParaRPr sz="1600">
+            <a:endParaRPr sz="1600" dirty="0">
               <a:solidFill>
                 <a:schemeClr val="dk1"/>
               </a:solidFill>
@@ -8434,14 +8415,56 @@
               <a:buAutoNum type="arabicPeriod"/>
             </a:pPr>
             <a:r>
-              <a:rPr lang="en" sz="1600">
+              <a:rPr lang="en" sz="1600" dirty="0">
                 <a:solidFill>
                   <a:schemeClr val="dk1"/>
                 </a:solidFill>
               </a:rPr>
-              <a:t>Add a detailed page for every dish using models</a:t>
+              <a:t>Add a detailed page for every dish using Django models</a:t>
             </a:r>
-            <a:endParaRPr sz="1600">
+          </a:p>
+          <a:p>
+            <a:pPr marL="457200" lvl="0" indent="-330200" algn="l" rtl="0">
+              <a:lnSpc>
+                <a:spcPct val="150000"/>
+              </a:lnSpc>
+              <a:spcBef>
+                <a:spcPts val="0"/>
+              </a:spcBef>
+              <a:spcAft>
+                <a:spcPts val="0"/>
+              </a:spcAft>
+              <a:buClr>
+                <a:schemeClr val="dk1"/>
+              </a:buClr>
+              <a:buSzPts val="1600"/>
+              <a:buAutoNum type="arabicPeriod"/>
+            </a:pPr>
+            <a:r>
+              <a:rPr lang="en" sz="1600" dirty="0">
+                <a:solidFill>
+                  <a:schemeClr val="dk1"/>
+                </a:solidFill>
+              </a:rPr>
+              <a:t>B</a:t>
+            </a:r>
+            <a:r>
+              <a:rPr lang="en-US" altLang="zh-CN" sz="1600" dirty="0" err="1">
+                <a:solidFill>
+                  <a:schemeClr val="dk1"/>
+                </a:solidFill>
+              </a:rPr>
+              <a:t>eautify</a:t>
+            </a:r>
+            <a:r>
+              <a:rPr lang="en-US" altLang="zh-CN" sz="1600" dirty="0">
+                <a:solidFill>
+                  <a:schemeClr val="dk1"/>
+                </a:solidFill>
+              </a:rPr>
+              <a:t> UI pages</a:t>
+            </a:r>
+            <a:endParaRPr sz="1600" dirty="0">
               <a:solidFill>
                 <a:schemeClr val="dk1"/>
               </a:solidFill>
@@ -8460,7 +8483,7 @@
               </a:spcAft>
               <a:buNone/>
             </a:pPr>
-            <a:endParaRPr sz="1600">
+            <a:endParaRPr sz="1600" dirty="0">
               <a:solidFill>
                 <a:schemeClr val="dk1"/>
               </a:solidFill>

</xml_diff>